<commit_message>
Add start/stop helper scripts for language-service
</commit_message>
<xml_diff>
--- a/mjc_lighning_talk_20161020.pptx
+++ b/mjc_lighning_talk_20161020.pptx
@@ -114,6 +114,11 @@
       </a:defRPr>
     </a:lvl9pPr>
   </p:defaultTextStyle>
+  <p:extLst>
+    <p:ext uri="{EFAFB233-063F-42B5-8137-9DF3F51BA10A}">
+      <p15:sldGuideLst xmlns:p15="http://schemas.microsoft.com/office/powerpoint/2012/main"/>
+    </p:ext>
+  </p:extLst>
 </p:presentation>
 </file>
 
@@ -6268,6 +6273,12 @@
         <p:txBody>
           <a:bodyPr/>
           <a:lstStyle/>
+          <a:p>
+            <a:r>
+              <a:rPr lang="en-GB"/>
+              <a:t>SpringBoot</a:t>
+            </a:r>
+          </a:p>
           <a:p>
             <a:r>
               <a:rPr lang="en-GB" dirty="0"/>

</xml_diff>

<commit_message>
Configure tests to start embedded server and example WireMock test
</commit_message>
<xml_diff>
--- a/mjc_lighning_talk_20161020.pptx
+++ b/mjc_lighning_talk_20161020.pptx
@@ -5,7 +5,7 @@
     <p:sldMasterId id="2147483888" r:id="rId1"/>
   </p:sldMasterIdLst>
   <p:notesMasterIdLst>
-    <p:notesMasterId r:id="rId10"/>
+    <p:notesMasterId r:id="rId12"/>
   </p:notesMasterIdLst>
   <p:sldIdLst>
     <p:sldId id="256" r:id="rId2"/>
@@ -16,6 +16,8 @@
     <p:sldId id="261" r:id="rId7"/>
     <p:sldId id="262" r:id="rId8"/>
     <p:sldId id="263" r:id="rId9"/>
+    <p:sldId id="265" r:id="rId10"/>
+    <p:sldId id="264" r:id="rId11"/>
   </p:sldIdLst>
   <p:sldSz cx="12192000" cy="6858000"/>
   <p:notesSz cx="6858000" cy="9144000"/>
@@ -204,7 +206,7 @@
           <a:p>
             <a:fld id="{FDC7A044-80D6-46C2-930D-F7E9591ABEB9}" type="datetimeFigureOut">
               <a:rPr lang="en-GB" smtClean="0"/>
-              <a:t>14/09/2016</a:t>
+              <a:t>26/09/2016</a:t>
             </a:fld>
             <a:endParaRPr lang="en-GB"/>
           </a:p>
@@ -648,7 +650,7 @@
           <a:p>
             <a:fld id="{86FCE54F-0372-4E4E-B527-70D6A14B2608}" type="datetimeFigureOut">
               <a:rPr lang="en-GB" smtClean="0"/>
-              <a:t>14/09/2016</a:t>
+              <a:t>26/09/2016</a:t>
             </a:fld>
             <a:endParaRPr lang="en-GB"/>
           </a:p>
@@ -818,7 +820,7 @@
           <a:p>
             <a:fld id="{86FCE54F-0372-4E4E-B527-70D6A14B2608}" type="datetimeFigureOut">
               <a:rPr lang="en-GB" smtClean="0"/>
-              <a:t>14/09/2016</a:t>
+              <a:t>26/09/2016</a:t>
             </a:fld>
             <a:endParaRPr lang="en-GB"/>
           </a:p>
@@ -1041,7 +1043,7 @@
           <a:p>
             <a:fld id="{86FCE54F-0372-4E4E-B527-70D6A14B2608}" type="datetimeFigureOut">
               <a:rPr lang="en-GB" smtClean="0"/>
-              <a:t>14/09/2016</a:t>
+              <a:t>26/09/2016</a:t>
             </a:fld>
             <a:endParaRPr lang="en-GB"/>
           </a:p>
@@ -1221,7 +1223,7 @@
           <a:p>
             <a:fld id="{86FCE54F-0372-4E4E-B527-70D6A14B2608}" type="datetimeFigureOut">
               <a:rPr lang="en-GB" smtClean="0"/>
-              <a:t>14/09/2016</a:t>
+              <a:t>26/09/2016</a:t>
             </a:fld>
             <a:endParaRPr lang="en-GB"/>
           </a:p>
@@ -1527,7 +1529,7 @@
           <a:p>
             <a:fld id="{86FCE54F-0372-4E4E-B527-70D6A14B2608}" type="datetimeFigureOut">
               <a:rPr lang="en-GB" smtClean="0"/>
-              <a:t>14/09/2016</a:t>
+              <a:t>26/09/2016</a:t>
             </a:fld>
             <a:endParaRPr lang="en-GB"/>
           </a:p>
@@ -1831,7 +1833,7 @@
           <a:p>
             <a:fld id="{86FCE54F-0372-4E4E-B527-70D6A14B2608}" type="datetimeFigureOut">
               <a:rPr lang="en-GB" smtClean="0"/>
-              <a:t>14/09/2016</a:t>
+              <a:t>26/09/2016</a:t>
             </a:fld>
             <a:endParaRPr lang="en-GB"/>
           </a:p>
@@ -2253,7 +2255,7 @@
           <a:p>
             <a:fld id="{86FCE54F-0372-4E4E-B527-70D6A14B2608}" type="datetimeFigureOut">
               <a:rPr lang="en-GB" smtClean="0"/>
-              <a:t>14/09/2016</a:t>
+              <a:t>26/09/2016</a:t>
             </a:fld>
             <a:endParaRPr lang="en-GB"/>
           </a:p>
@@ -2371,7 +2373,7 @@
           <a:p>
             <a:fld id="{86FCE54F-0372-4E4E-B527-70D6A14B2608}" type="datetimeFigureOut">
               <a:rPr lang="en-GB" smtClean="0"/>
-              <a:t>14/09/2016</a:t>
+              <a:t>26/09/2016</a:t>
             </a:fld>
             <a:endParaRPr lang="en-GB"/>
           </a:p>
@@ -2466,7 +2468,7 @@
           <a:p>
             <a:fld id="{86FCE54F-0372-4E4E-B527-70D6A14B2608}" type="datetimeFigureOut">
               <a:rPr lang="en-GB" smtClean="0"/>
-              <a:t>14/09/2016</a:t>
+              <a:t>26/09/2016</a:t>
             </a:fld>
             <a:endParaRPr lang="en-GB"/>
           </a:p>
@@ -2739,7 +2741,7 @@
           <a:p>
             <a:fld id="{86FCE54F-0372-4E4E-B527-70D6A14B2608}" type="datetimeFigureOut">
               <a:rPr lang="en-GB" smtClean="0"/>
-              <a:t>14/09/2016</a:t>
+              <a:t>26/09/2016</a:t>
             </a:fld>
             <a:endParaRPr lang="en-GB"/>
           </a:p>
@@ -3004,7 +3006,7 @@
           <a:p>
             <a:fld id="{86FCE54F-0372-4E4E-B527-70D6A14B2608}" type="datetimeFigureOut">
               <a:rPr lang="en-GB" smtClean="0"/>
-              <a:t>14/09/2016</a:t>
+              <a:t>26/09/2016</a:t>
             </a:fld>
             <a:endParaRPr lang="en-GB"/>
           </a:p>
@@ -3253,7 +3255,7 @@
           <a:p>
             <a:fld id="{86FCE54F-0372-4E4E-B527-70D6A14B2608}" type="datetimeFigureOut">
               <a:rPr lang="en-GB" smtClean="0"/>
-              <a:t>14/09/2016</a:t>
+              <a:t>26/09/2016</a:t>
             </a:fld>
             <a:endParaRPr lang="en-GB"/>
           </a:p>
@@ -3802,6 +3804,525 @@
 </p:sld>
 </file>
 
+<file path=ppt/slides/slide10.xml><?xml version="1.0" encoding="utf-8"?>
+<p:sld xmlns:a="http://schemas.openxmlformats.org/drawingml/2006/main" xmlns:r="http://schemas.openxmlformats.org/officeDocument/2006/relationships" xmlns:p="http://schemas.openxmlformats.org/presentationml/2006/main">
+  <p:cSld>
+    <p:spTree>
+      <p:nvGrpSpPr>
+        <p:cNvPr id="1" name=""/>
+        <p:cNvGrpSpPr/>
+        <p:nvPr/>
+      </p:nvGrpSpPr>
+      <p:grpSpPr>
+        <a:xfrm>
+          <a:off x="0" y="0"/>
+          <a:ext cx="0" cy="0"/>
+          <a:chOff x="0" y="0"/>
+          <a:chExt cx="0" cy="0"/>
+        </a:xfrm>
+      </p:grpSpPr>
+      <p:sp>
+        <p:nvSpPr>
+          <p:cNvPr id="2" name="Title 1"/>
+          <p:cNvSpPr>
+            <a:spLocks noGrp="1"/>
+          </p:cNvSpPr>
+          <p:nvPr>
+            <p:ph type="title"/>
+          </p:nvPr>
+        </p:nvSpPr>
+        <p:spPr/>
+        <p:txBody>
+          <a:bodyPr/>
+          <a:lstStyle/>
+          <a:p>
+            <a:r>
+              <a:rPr lang="en-GB" dirty="0"/>
+              <a:t>demo</a:t>
+            </a:r>
+          </a:p>
+        </p:txBody>
+      </p:sp>
+      <p:sp>
+        <p:nvSpPr>
+          <p:cNvPr id="3" name="Content Placeholder 2"/>
+          <p:cNvSpPr>
+            <a:spLocks noGrp="1"/>
+          </p:cNvSpPr>
+          <p:nvPr>
+            <p:ph idx="1"/>
+          </p:nvPr>
+        </p:nvSpPr>
+        <p:spPr/>
+        <p:txBody>
+          <a:bodyPr/>
+          <a:lstStyle/>
+          <a:p>
+            <a:r>
+              <a:rPr lang="en-GB" dirty="0"/>
+              <a:t>Language Processor</a:t>
+            </a:r>
+          </a:p>
+          <a:p>
+            <a:endParaRPr lang="en-GB" dirty="0"/>
+          </a:p>
+          <a:p>
+            <a:pPr lvl="1"/>
+            <a:r>
+              <a:rPr lang="en-GB" dirty="0"/>
+              <a:t>GET: ../</a:t>
+            </a:r>
+            <a:r>
+              <a:rPr lang="en-GB" dirty="0" err="1"/>
+              <a:t>languageProcessor</a:t>
+            </a:r>
+            <a:r>
+              <a:rPr lang="en-GB" dirty="0"/>
+              <a:t>/describe</a:t>
+            </a:r>
+          </a:p>
+          <a:p>
+            <a:pPr lvl="1"/>
+            <a:endParaRPr lang="en-GB" dirty="0"/>
+          </a:p>
+          <a:p>
+            <a:pPr marL="228600" lvl="1" indent="0">
+              <a:buNone/>
+            </a:pPr>
+            <a:r>
+              <a:rPr lang="en-GB" dirty="0"/>
+              <a:t>	Year created &lt; 2000</a:t>
+            </a:r>
+          </a:p>
+          <a:p>
+            <a:pPr lvl="1"/>
+            <a:endParaRPr lang="en-GB" dirty="0"/>
+          </a:p>
+          <a:p>
+            <a:pPr marL="457200" lvl="2" indent="0">
+              <a:buNone/>
+            </a:pPr>
+            <a:r>
+              <a:rPr lang="en-GB" dirty="0"/>
+              <a:t>		“This is old school...”</a:t>
+            </a:r>
+          </a:p>
+          <a:p>
+            <a:pPr marL="457200" lvl="2" indent="0">
+              <a:buNone/>
+            </a:pPr>
+            <a:endParaRPr lang="en-GB" dirty="0"/>
+          </a:p>
+          <a:p>
+            <a:pPr marL="228600" lvl="1" indent="0">
+              <a:buNone/>
+            </a:pPr>
+            <a:r>
+              <a:rPr lang="en-GB" dirty="0"/>
+              <a:t>	Else</a:t>
+            </a:r>
+          </a:p>
+          <a:p>
+            <a:pPr lvl="1"/>
+            <a:endParaRPr lang="en-GB" dirty="0"/>
+          </a:p>
+          <a:p>
+            <a:pPr marL="457200" lvl="2" indent="0">
+              <a:buNone/>
+            </a:pPr>
+            <a:r>
+              <a:rPr lang="en-GB" dirty="0"/>
+              <a:t>	</a:t>
+            </a:r>
+            <a:r>
+              <a:rPr lang="en-GB"/>
+              <a:t>	“Down </a:t>
+            </a:r>
+            <a:r>
+              <a:rPr lang="en-GB" dirty="0"/>
+              <a:t>with the </a:t>
+            </a:r>
+            <a:r>
+              <a:rPr lang="en-GB"/>
+              <a:t>kids!”</a:t>
+            </a:r>
+            <a:endParaRPr lang="en-GB" dirty="0"/>
+          </a:p>
+        </p:txBody>
+      </p:sp>
+    </p:spTree>
+    <p:extLst>
+      <p:ext uri="{BB962C8B-B14F-4D97-AF65-F5344CB8AC3E}">
+        <p14:creationId xmlns:p14="http://schemas.microsoft.com/office/powerpoint/2010/main" val="922220685"/>
+      </p:ext>
+    </p:extLst>
+  </p:cSld>
+  <p:clrMapOvr>
+    <a:masterClrMapping/>
+  </p:clrMapOvr>
+  <p:timing>
+    <p:tnLst>
+      <p:par>
+        <p:cTn id="1" dur="indefinite" restart="never" nodeType="tmRoot">
+          <p:childTnLst>
+            <p:seq concurrent="1" nextAc="seek">
+              <p:cTn id="2" dur="indefinite" nodeType="mainSeq">
+                <p:childTnLst>
+                  <p:par>
+                    <p:cTn id="3" fill="hold">
+                      <p:stCondLst>
+                        <p:cond delay="indefinite"/>
+                      </p:stCondLst>
+                      <p:childTnLst>
+                        <p:par>
+                          <p:cTn id="4" fill="hold">
+                            <p:stCondLst>
+                              <p:cond delay="0"/>
+                            </p:stCondLst>
+                            <p:childTnLst>
+                              <p:par>
+                                <p:cTn id="5" presetID="10" presetClass="entr" presetSubtype="0" fill="hold" nodeType="clickEffect">
+                                  <p:stCondLst>
+                                    <p:cond delay="0"/>
+                                  </p:stCondLst>
+                                  <p:childTnLst>
+                                    <p:set>
+                                      <p:cBhvr>
+                                        <p:cTn id="6" dur="1" fill="hold">
+                                          <p:stCondLst>
+                                            <p:cond delay="0"/>
+                                          </p:stCondLst>
+                                        </p:cTn>
+                                        <p:tgtEl>
+                                          <p:spTgt spid="3">
+                                            <p:txEl>
+                                              <p:pRg st="0" end="0"/>
+                                            </p:txEl>
+                                          </p:spTgt>
+                                        </p:tgtEl>
+                                        <p:attrNameLst>
+                                          <p:attrName>style.visibility</p:attrName>
+                                        </p:attrNameLst>
+                                      </p:cBhvr>
+                                      <p:to>
+                                        <p:strVal val="visible"/>
+                                      </p:to>
+                                    </p:set>
+                                    <p:animEffect transition="in" filter="fade">
+                                      <p:cBhvr>
+                                        <p:cTn id="7" dur="500"/>
+                                        <p:tgtEl>
+                                          <p:spTgt spid="3">
+                                            <p:txEl>
+                                              <p:pRg st="0" end="0"/>
+                                            </p:txEl>
+                                          </p:spTgt>
+                                        </p:tgtEl>
+                                      </p:cBhvr>
+                                    </p:animEffect>
+                                  </p:childTnLst>
+                                </p:cTn>
+                              </p:par>
+                            </p:childTnLst>
+                          </p:cTn>
+                        </p:par>
+                      </p:childTnLst>
+                    </p:cTn>
+                  </p:par>
+                  <p:par>
+                    <p:cTn id="8" fill="hold">
+                      <p:stCondLst>
+                        <p:cond delay="indefinite"/>
+                      </p:stCondLst>
+                      <p:childTnLst>
+                        <p:par>
+                          <p:cTn id="9" fill="hold">
+                            <p:stCondLst>
+                              <p:cond delay="0"/>
+                            </p:stCondLst>
+                            <p:childTnLst>
+                              <p:par>
+                                <p:cTn id="10" presetID="10" presetClass="entr" presetSubtype="0" fill="hold" nodeType="clickEffect">
+                                  <p:stCondLst>
+                                    <p:cond delay="0"/>
+                                  </p:stCondLst>
+                                  <p:childTnLst>
+                                    <p:set>
+                                      <p:cBhvr>
+                                        <p:cTn id="11" dur="1" fill="hold">
+                                          <p:stCondLst>
+                                            <p:cond delay="0"/>
+                                          </p:stCondLst>
+                                        </p:cTn>
+                                        <p:tgtEl>
+                                          <p:spTgt spid="3">
+                                            <p:txEl>
+                                              <p:pRg st="2" end="2"/>
+                                            </p:txEl>
+                                          </p:spTgt>
+                                        </p:tgtEl>
+                                        <p:attrNameLst>
+                                          <p:attrName>style.visibility</p:attrName>
+                                        </p:attrNameLst>
+                                      </p:cBhvr>
+                                      <p:to>
+                                        <p:strVal val="visible"/>
+                                      </p:to>
+                                    </p:set>
+                                    <p:animEffect transition="in" filter="fade">
+                                      <p:cBhvr>
+                                        <p:cTn id="12" dur="500"/>
+                                        <p:tgtEl>
+                                          <p:spTgt spid="3">
+                                            <p:txEl>
+                                              <p:pRg st="2" end="2"/>
+                                            </p:txEl>
+                                          </p:spTgt>
+                                        </p:tgtEl>
+                                      </p:cBhvr>
+                                    </p:animEffect>
+                                  </p:childTnLst>
+                                </p:cTn>
+                              </p:par>
+                            </p:childTnLst>
+                          </p:cTn>
+                        </p:par>
+                      </p:childTnLst>
+                    </p:cTn>
+                  </p:par>
+                  <p:par>
+                    <p:cTn id="13" fill="hold">
+                      <p:stCondLst>
+                        <p:cond delay="indefinite"/>
+                      </p:stCondLst>
+                      <p:childTnLst>
+                        <p:par>
+                          <p:cTn id="14" fill="hold">
+                            <p:stCondLst>
+                              <p:cond delay="0"/>
+                            </p:stCondLst>
+                            <p:childTnLst>
+                              <p:par>
+                                <p:cTn id="15" presetID="10" presetClass="entr" presetSubtype="0" fill="hold" nodeType="clickEffect">
+                                  <p:stCondLst>
+                                    <p:cond delay="0"/>
+                                  </p:stCondLst>
+                                  <p:childTnLst>
+                                    <p:set>
+                                      <p:cBhvr>
+                                        <p:cTn id="16" dur="1" fill="hold">
+                                          <p:stCondLst>
+                                            <p:cond delay="0"/>
+                                          </p:stCondLst>
+                                        </p:cTn>
+                                        <p:tgtEl>
+                                          <p:spTgt spid="3">
+                                            <p:txEl>
+                                              <p:pRg st="4" end="4"/>
+                                            </p:txEl>
+                                          </p:spTgt>
+                                        </p:tgtEl>
+                                        <p:attrNameLst>
+                                          <p:attrName>style.visibility</p:attrName>
+                                        </p:attrNameLst>
+                                      </p:cBhvr>
+                                      <p:to>
+                                        <p:strVal val="visible"/>
+                                      </p:to>
+                                    </p:set>
+                                    <p:animEffect transition="in" filter="fade">
+                                      <p:cBhvr>
+                                        <p:cTn id="17" dur="500"/>
+                                        <p:tgtEl>
+                                          <p:spTgt spid="3">
+                                            <p:txEl>
+                                              <p:pRg st="4" end="4"/>
+                                            </p:txEl>
+                                          </p:spTgt>
+                                        </p:tgtEl>
+                                      </p:cBhvr>
+                                    </p:animEffect>
+                                  </p:childTnLst>
+                                </p:cTn>
+                              </p:par>
+                              <p:par>
+                                <p:cTn id="18" presetID="10" presetClass="entr" presetSubtype="0" fill="hold" nodeType="withEffect">
+                                  <p:stCondLst>
+                                    <p:cond delay="0"/>
+                                  </p:stCondLst>
+                                  <p:childTnLst>
+                                    <p:set>
+                                      <p:cBhvr>
+                                        <p:cTn id="19" dur="1" fill="hold">
+                                          <p:stCondLst>
+                                            <p:cond delay="0"/>
+                                          </p:stCondLst>
+                                        </p:cTn>
+                                        <p:tgtEl>
+                                          <p:spTgt spid="3">
+                                            <p:txEl>
+                                              <p:pRg st="6" end="6"/>
+                                            </p:txEl>
+                                          </p:spTgt>
+                                        </p:tgtEl>
+                                        <p:attrNameLst>
+                                          <p:attrName>style.visibility</p:attrName>
+                                        </p:attrNameLst>
+                                      </p:cBhvr>
+                                      <p:to>
+                                        <p:strVal val="visible"/>
+                                      </p:to>
+                                    </p:set>
+                                    <p:animEffect transition="in" filter="fade">
+                                      <p:cBhvr>
+                                        <p:cTn id="20" dur="500"/>
+                                        <p:tgtEl>
+                                          <p:spTgt spid="3">
+                                            <p:txEl>
+                                              <p:pRg st="6" end="6"/>
+                                            </p:txEl>
+                                          </p:spTgt>
+                                        </p:tgtEl>
+                                      </p:cBhvr>
+                                    </p:animEffect>
+                                  </p:childTnLst>
+                                </p:cTn>
+                              </p:par>
+                            </p:childTnLst>
+                          </p:cTn>
+                        </p:par>
+                      </p:childTnLst>
+                    </p:cTn>
+                  </p:par>
+                  <p:par>
+                    <p:cTn id="21" fill="hold">
+                      <p:stCondLst>
+                        <p:cond delay="indefinite"/>
+                      </p:stCondLst>
+                      <p:childTnLst>
+                        <p:par>
+                          <p:cTn id="22" fill="hold">
+                            <p:stCondLst>
+                              <p:cond delay="0"/>
+                            </p:stCondLst>
+                            <p:childTnLst>
+                              <p:par>
+                                <p:cTn id="23" presetID="10" presetClass="entr" presetSubtype="0" fill="hold" nodeType="clickEffect">
+                                  <p:stCondLst>
+                                    <p:cond delay="0"/>
+                                  </p:stCondLst>
+                                  <p:childTnLst>
+                                    <p:set>
+                                      <p:cBhvr>
+                                        <p:cTn id="24" dur="1" fill="hold">
+                                          <p:stCondLst>
+                                            <p:cond delay="0"/>
+                                          </p:stCondLst>
+                                        </p:cTn>
+                                        <p:tgtEl>
+                                          <p:spTgt spid="3">
+                                            <p:txEl>
+                                              <p:pRg st="8" end="8"/>
+                                            </p:txEl>
+                                          </p:spTgt>
+                                        </p:tgtEl>
+                                        <p:attrNameLst>
+                                          <p:attrName>style.visibility</p:attrName>
+                                        </p:attrNameLst>
+                                      </p:cBhvr>
+                                      <p:to>
+                                        <p:strVal val="visible"/>
+                                      </p:to>
+                                    </p:set>
+                                    <p:animEffect transition="in" filter="fade">
+                                      <p:cBhvr>
+                                        <p:cTn id="25" dur="500"/>
+                                        <p:tgtEl>
+                                          <p:spTgt spid="3">
+                                            <p:txEl>
+                                              <p:pRg st="8" end="8"/>
+                                            </p:txEl>
+                                          </p:spTgt>
+                                        </p:tgtEl>
+                                      </p:cBhvr>
+                                    </p:animEffect>
+                                  </p:childTnLst>
+                                </p:cTn>
+                              </p:par>
+                              <p:par>
+                                <p:cTn id="26" presetID="10" presetClass="entr" presetSubtype="0" fill="hold" nodeType="withEffect">
+                                  <p:stCondLst>
+                                    <p:cond delay="0"/>
+                                  </p:stCondLst>
+                                  <p:childTnLst>
+                                    <p:set>
+                                      <p:cBhvr>
+                                        <p:cTn id="27" dur="1" fill="hold">
+                                          <p:stCondLst>
+                                            <p:cond delay="0"/>
+                                          </p:stCondLst>
+                                        </p:cTn>
+                                        <p:tgtEl>
+                                          <p:spTgt spid="3">
+                                            <p:txEl>
+                                              <p:pRg st="10" end="10"/>
+                                            </p:txEl>
+                                          </p:spTgt>
+                                        </p:tgtEl>
+                                        <p:attrNameLst>
+                                          <p:attrName>style.visibility</p:attrName>
+                                        </p:attrNameLst>
+                                      </p:cBhvr>
+                                      <p:to>
+                                        <p:strVal val="visible"/>
+                                      </p:to>
+                                    </p:set>
+                                    <p:animEffect transition="in" filter="fade">
+                                      <p:cBhvr>
+                                        <p:cTn id="28" dur="500"/>
+                                        <p:tgtEl>
+                                          <p:spTgt spid="3">
+                                            <p:txEl>
+                                              <p:pRg st="10" end="10"/>
+                                            </p:txEl>
+                                          </p:spTgt>
+                                        </p:tgtEl>
+                                      </p:cBhvr>
+                                    </p:animEffect>
+                                  </p:childTnLst>
+                                </p:cTn>
+                              </p:par>
+                            </p:childTnLst>
+                          </p:cTn>
+                        </p:par>
+                      </p:childTnLst>
+                    </p:cTn>
+                  </p:par>
+                </p:childTnLst>
+              </p:cTn>
+              <p:prevCondLst>
+                <p:cond evt="onPrev" delay="0">
+                  <p:tgtEl>
+                    <p:sldTgt/>
+                  </p:tgtEl>
+                </p:cond>
+              </p:prevCondLst>
+              <p:nextCondLst>
+                <p:cond evt="onNext" delay="0">
+                  <p:tgtEl>
+                    <p:sldTgt/>
+                  </p:tgtEl>
+                </p:cond>
+              </p:nextCondLst>
+            </p:seq>
+          </p:childTnLst>
+        </p:cTn>
+      </p:par>
+    </p:tnLst>
+  </p:timing>
+</p:sld>
+</file>
+
 <file path=ppt/slides/slide2.xml><?xml version="1.0" encoding="utf-8"?>
 <p:sld xmlns:a="http://schemas.openxmlformats.org/drawingml/2006/main" xmlns:r="http://schemas.openxmlformats.org/officeDocument/2006/relationships" xmlns:p="http://schemas.openxmlformats.org/presentationml/2006/main">
   <p:cSld>
@@ -6271,53 +6792,114 @@
         </p:nvSpPr>
         <p:spPr/>
         <p:txBody>
-          <a:bodyPr/>
+          <a:bodyPr>
+            <a:normAutofit/>
+          </a:bodyPr>
           <a:lstStyle/>
           <a:p>
             <a:r>
-              <a:rPr lang="en-GB"/>
+              <a:rPr lang="en-GB" dirty="0" err="1"/>
               <a:t>SpringBoot</a:t>
             </a:r>
-          </a:p>
-          <a:p>
+            <a:endParaRPr lang="en-GB" dirty="0"/>
+          </a:p>
+          <a:p>
+            <a:pPr lvl="1"/>
             <a:r>
               <a:rPr lang="en-GB" dirty="0"/>
-              <a:t>Language Service</a:t>
+              <a:t>@</a:t>
+            </a:r>
+            <a:r>
+              <a:rPr lang="en-GB" dirty="0" err="1"/>
+              <a:t>SpringBootTest</a:t>
+            </a:r>
+            <a:endParaRPr lang="en-GB" dirty="0"/>
+          </a:p>
+          <a:p>
+            <a:pPr lvl="2"/>
+            <a:r>
+              <a:rPr lang="en-GB" dirty="0" err="1"/>
+              <a:t>WebEnvironment</a:t>
+            </a:r>
+            <a:endParaRPr lang="en-GB" dirty="0"/>
+          </a:p>
+          <a:p>
+            <a:pPr lvl="2"/>
+            <a:r>
+              <a:rPr lang="en-GB" dirty="0" err="1"/>
+              <a:t>TestRestTemplate</a:t>
+            </a:r>
+            <a:endParaRPr lang="en-GB" dirty="0"/>
+          </a:p>
+          <a:p>
+            <a:r>
+              <a:rPr lang="en-GB" dirty="0"/>
+              <a:t>Integration Tests</a:t>
             </a:r>
           </a:p>
           <a:p>
             <a:pPr lvl="1"/>
             <a:r>
+              <a:rPr lang="en-GB" dirty="0" err="1">
+                <a:latin typeface="Courier New" panose="02070309020205020404" pitchFamily="49" charset="0"/>
+                <a:cs typeface="Courier New" panose="02070309020205020404" pitchFamily="49" charset="0"/>
+              </a:rPr>
+              <a:t>mvn</a:t>
+            </a:r>
+            <a:r>
+              <a:rPr lang="en-GB" dirty="0">
+                <a:latin typeface="Courier New" panose="02070309020205020404" pitchFamily="49" charset="0"/>
+                <a:cs typeface="Courier New" panose="02070309020205020404" pitchFamily="49" charset="0"/>
+              </a:rPr>
+              <a:t> verify</a:t>
+            </a:r>
+          </a:p>
+          <a:p>
+            <a:pPr lvl="1"/>
+            <a:r>
+              <a:rPr lang="en-GB" dirty="0">
+                <a:latin typeface="Courier New" panose="02070309020205020404" pitchFamily="49" charset="0"/>
+                <a:cs typeface="Courier New" panose="02070309020205020404" pitchFamily="49" charset="0"/>
+              </a:rPr>
+              <a:t>Or, run via IntelliJ for user friendly </a:t>
+            </a:r>
+            <a:r>
+              <a:rPr lang="en-GB">
+                <a:latin typeface="Courier New" panose="02070309020205020404" pitchFamily="49" charset="0"/>
+                <a:cs typeface="Courier New" panose="02070309020205020404" pitchFamily="49" charset="0"/>
+              </a:rPr>
+              <a:t>test results</a:t>
+            </a:r>
+            <a:endParaRPr lang="en-GB" dirty="0">
+              <a:latin typeface="Courier New" panose="02070309020205020404" pitchFamily="49" charset="0"/>
+              <a:cs typeface="Courier New" panose="02070309020205020404" pitchFamily="49" charset="0"/>
+            </a:endParaRPr>
+          </a:p>
+          <a:p>
+            <a:r>
+              <a:rPr lang="en-GB" dirty="0" err="1"/>
+              <a:t>WireMock</a:t>
+            </a:r>
+            <a:r>
               <a:rPr lang="en-GB" dirty="0"/>
-              <a:t>Request</a:t>
+              <a:t> JUnit API</a:t>
             </a:r>
           </a:p>
           <a:p>
             <a:pPr lvl="1"/>
             <a:r>
               <a:rPr lang="en-GB" dirty="0"/>
-              <a:t>Response</a:t>
-            </a:r>
-          </a:p>
-          <a:p>
-            <a:r>
-              <a:rPr lang="en-GB" dirty="0"/>
-              <a:t>Language Processor</a:t>
-            </a:r>
-          </a:p>
-          <a:p>
-            <a:pPr lvl="1"/>
-            <a:r>
-              <a:rPr lang="en-GB" dirty="0"/>
-              <a:t>Request</a:t>
-            </a:r>
-          </a:p>
-          <a:p>
-            <a:pPr lvl="1"/>
-            <a:r>
-              <a:rPr lang="en-GB" dirty="0"/>
-              <a:t>Response</a:t>
-            </a:r>
+              <a:t>JUnit @Rule</a:t>
+            </a:r>
+          </a:p>
+          <a:p>
+            <a:endParaRPr lang="en-GB" dirty="0"/>
+          </a:p>
+          <a:p>
+            <a:pPr marL="0" indent="0">
+              <a:buNone/>
+            </a:pPr>
+            <a:endParaRPr lang="en-GB" dirty="0"/>
           </a:p>
         </p:txBody>
       </p:sp>
@@ -6331,6 +6913,1123 @@
   <p:clrMapOvr>
     <a:masterClrMapping/>
   </p:clrMapOvr>
+  <p:timing>
+    <p:tnLst>
+      <p:par>
+        <p:cTn id="1" dur="indefinite" restart="never" nodeType="tmRoot">
+          <p:childTnLst>
+            <p:seq concurrent="1" nextAc="seek">
+              <p:cTn id="2" dur="indefinite" nodeType="mainSeq">
+                <p:childTnLst>
+                  <p:par>
+                    <p:cTn id="3" fill="hold">
+                      <p:stCondLst>
+                        <p:cond delay="indefinite"/>
+                      </p:stCondLst>
+                      <p:childTnLst>
+                        <p:par>
+                          <p:cTn id="4" fill="hold">
+                            <p:stCondLst>
+                              <p:cond delay="0"/>
+                            </p:stCondLst>
+                            <p:childTnLst>
+                              <p:par>
+                                <p:cTn id="5" presetID="10" presetClass="entr" presetSubtype="0" fill="hold" nodeType="clickEffect">
+                                  <p:stCondLst>
+                                    <p:cond delay="0"/>
+                                  </p:stCondLst>
+                                  <p:childTnLst>
+                                    <p:set>
+                                      <p:cBhvr>
+                                        <p:cTn id="6" dur="1" fill="hold">
+                                          <p:stCondLst>
+                                            <p:cond delay="0"/>
+                                          </p:stCondLst>
+                                        </p:cTn>
+                                        <p:tgtEl>
+                                          <p:spTgt spid="3">
+                                            <p:txEl>
+                                              <p:pRg st="0" end="0"/>
+                                            </p:txEl>
+                                          </p:spTgt>
+                                        </p:tgtEl>
+                                        <p:attrNameLst>
+                                          <p:attrName>style.visibility</p:attrName>
+                                        </p:attrNameLst>
+                                      </p:cBhvr>
+                                      <p:to>
+                                        <p:strVal val="visible"/>
+                                      </p:to>
+                                    </p:set>
+                                    <p:animEffect transition="in" filter="fade">
+                                      <p:cBhvr>
+                                        <p:cTn id="7" dur="500"/>
+                                        <p:tgtEl>
+                                          <p:spTgt spid="3">
+                                            <p:txEl>
+                                              <p:pRg st="0" end="0"/>
+                                            </p:txEl>
+                                          </p:spTgt>
+                                        </p:tgtEl>
+                                      </p:cBhvr>
+                                    </p:animEffect>
+                                  </p:childTnLst>
+                                </p:cTn>
+                              </p:par>
+                            </p:childTnLst>
+                          </p:cTn>
+                        </p:par>
+                      </p:childTnLst>
+                    </p:cTn>
+                  </p:par>
+                  <p:par>
+                    <p:cTn id="8" fill="hold">
+                      <p:stCondLst>
+                        <p:cond delay="indefinite"/>
+                      </p:stCondLst>
+                      <p:childTnLst>
+                        <p:par>
+                          <p:cTn id="9" fill="hold">
+                            <p:stCondLst>
+                              <p:cond delay="0"/>
+                            </p:stCondLst>
+                            <p:childTnLst>
+                              <p:par>
+                                <p:cTn id="10" presetID="10" presetClass="entr" presetSubtype="0" fill="hold" nodeType="clickEffect">
+                                  <p:stCondLst>
+                                    <p:cond delay="0"/>
+                                  </p:stCondLst>
+                                  <p:childTnLst>
+                                    <p:set>
+                                      <p:cBhvr>
+                                        <p:cTn id="11" dur="1" fill="hold">
+                                          <p:stCondLst>
+                                            <p:cond delay="0"/>
+                                          </p:stCondLst>
+                                        </p:cTn>
+                                        <p:tgtEl>
+                                          <p:spTgt spid="3">
+                                            <p:txEl>
+                                              <p:pRg st="1" end="1"/>
+                                            </p:txEl>
+                                          </p:spTgt>
+                                        </p:tgtEl>
+                                        <p:attrNameLst>
+                                          <p:attrName>style.visibility</p:attrName>
+                                        </p:attrNameLst>
+                                      </p:cBhvr>
+                                      <p:to>
+                                        <p:strVal val="visible"/>
+                                      </p:to>
+                                    </p:set>
+                                    <p:animEffect transition="in" filter="fade">
+                                      <p:cBhvr>
+                                        <p:cTn id="12" dur="500"/>
+                                        <p:tgtEl>
+                                          <p:spTgt spid="3">
+                                            <p:txEl>
+                                              <p:pRg st="1" end="1"/>
+                                            </p:txEl>
+                                          </p:spTgt>
+                                        </p:tgtEl>
+                                      </p:cBhvr>
+                                    </p:animEffect>
+                                  </p:childTnLst>
+                                </p:cTn>
+                              </p:par>
+                            </p:childTnLst>
+                          </p:cTn>
+                        </p:par>
+                      </p:childTnLst>
+                    </p:cTn>
+                  </p:par>
+                  <p:par>
+                    <p:cTn id="13" fill="hold">
+                      <p:stCondLst>
+                        <p:cond delay="indefinite"/>
+                      </p:stCondLst>
+                      <p:childTnLst>
+                        <p:par>
+                          <p:cTn id="14" fill="hold">
+                            <p:stCondLst>
+                              <p:cond delay="0"/>
+                            </p:stCondLst>
+                            <p:childTnLst>
+                              <p:par>
+                                <p:cTn id="15" presetID="10" presetClass="entr" presetSubtype="0" fill="hold" nodeType="clickEffect">
+                                  <p:stCondLst>
+                                    <p:cond delay="0"/>
+                                  </p:stCondLst>
+                                  <p:childTnLst>
+                                    <p:set>
+                                      <p:cBhvr>
+                                        <p:cTn id="16" dur="1" fill="hold">
+                                          <p:stCondLst>
+                                            <p:cond delay="0"/>
+                                          </p:stCondLst>
+                                        </p:cTn>
+                                        <p:tgtEl>
+                                          <p:spTgt spid="3">
+                                            <p:txEl>
+                                              <p:pRg st="2" end="2"/>
+                                            </p:txEl>
+                                          </p:spTgt>
+                                        </p:tgtEl>
+                                        <p:attrNameLst>
+                                          <p:attrName>style.visibility</p:attrName>
+                                        </p:attrNameLst>
+                                      </p:cBhvr>
+                                      <p:to>
+                                        <p:strVal val="visible"/>
+                                      </p:to>
+                                    </p:set>
+                                    <p:animEffect transition="in" filter="fade">
+                                      <p:cBhvr>
+                                        <p:cTn id="17" dur="500"/>
+                                        <p:tgtEl>
+                                          <p:spTgt spid="3">
+                                            <p:txEl>
+                                              <p:pRg st="2" end="2"/>
+                                            </p:txEl>
+                                          </p:spTgt>
+                                        </p:tgtEl>
+                                      </p:cBhvr>
+                                    </p:animEffect>
+                                  </p:childTnLst>
+                                </p:cTn>
+                              </p:par>
+                            </p:childTnLst>
+                          </p:cTn>
+                        </p:par>
+                      </p:childTnLst>
+                    </p:cTn>
+                  </p:par>
+                  <p:par>
+                    <p:cTn id="18" fill="hold">
+                      <p:stCondLst>
+                        <p:cond delay="indefinite"/>
+                      </p:stCondLst>
+                      <p:childTnLst>
+                        <p:par>
+                          <p:cTn id="19" fill="hold">
+                            <p:stCondLst>
+                              <p:cond delay="0"/>
+                            </p:stCondLst>
+                            <p:childTnLst>
+                              <p:par>
+                                <p:cTn id="20" presetID="10" presetClass="entr" presetSubtype="0" fill="hold" nodeType="clickEffect">
+                                  <p:stCondLst>
+                                    <p:cond delay="0"/>
+                                  </p:stCondLst>
+                                  <p:childTnLst>
+                                    <p:set>
+                                      <p:cBhvr>
+                                        <p:cTn id="21" dur="1" fill="hold">
+                                          <p:stCondLst>
+                                            <p:cond delay="0"/>
+                                          </p:stCondLst>
+                                        </p:cTn>
+                                        <p:tgtEl>
+                                          <p:spTgt spid="3">
+                                            <p:txEl>
+                                              <p:pRg st="3" end="3"/>
+                                            </p:txEl>
+                                          </p:spTgt>
+                                        </p:tgtEl>
+                                        <p:attrNameLst>
+                                          <p:attrName>style.visibility</p:attrName>
+                                        </p:attrNameLst>
+                                      </p:cBhvr>
+                                      <p:to>
+                                        <p:strVal val="visible"/>
+                                      </p:to>
+                                    </p:set>
+                                    <p:animEffect transition="in" filter="fade">
+                                      <p:cBhvr>
+                                        <p:cTn id="22" dur="500"/>
+                                        <p:tgtEl>
+                                          <p:spTgt spid="3">
+                                            <p:txEl>
+                                              <p:pRg st="3" end="3"/>
+                                            </p:txEl>
+                                          </p:spTgt>
+                                        </p:tgtEl>
+                                      </p:cBhvr>
+                                    </p:animEffect>
+                                  </p:childTnLst>
+                                </p:cTn>
+                              </p:par>
+                            </p:childTnLst>
+                          </p:cTn>
+                        </p:par>
+                      </p:childTnLst>
+                    </p:cTn>
+                  </p:par>
+                  <p:par>
+                    <p:cTn id="23" fill="hold">
+                      <p:stCondLst>
+                        <p:cond delay="indefinite"/>
+                      </p:stCondLst>
+                      <p:childTnLst>
+                        <p:par>
+                          <p:cTn id="24" fill="hold">
+                            <p:stCondLst>
+                              <p:cond delay="0"/>
+                            </p:stCondLst>
+                            <p:childTnLst>
+                              <p:par>
+                                <p:cTn id="25" presetID="10" presetClass="entr" presetSubtype="0" fill="hold" nodeType="clickEffect">
+                                  <p:stCondLst>
+                                    <p:cond delay="0"/>
+                                  </p:stCondLst>
+                                  <p:childTnLst>
+                                    <p:set>
+                                      <p:cBhvr>
+                                        <p:cTn id="26" dur="1" fill="hold">
+                                          <p:stCondLst>
+                                            <p:cond delay="0"/>
+                                          </p:stCondLst>
+                                        </p:cTn>
+                                        <p:tgtEl>
+                                          <p:spTgt spid="3">
+                                            <p:txEl>
+                                              <p:pRg st="4" end="4"/>
+                                            </p:txEl>
+                                          </p:spTgt>
+                                        </p:tgtEl>
+                                        <p:attrNameLst>
+                                          <p:attrName>style.visibility</p:attrName>
+                                        </p:attrNameLst>
+                                      </p:cBhvr>
+                                      <p:to>
+                                        <p:strVal val="visible"/>
+                                      </p:to>
+                                    </p:set>
+                                    <p:animEffect transition="in" filter="fade">
+                                      <p:cBhvr>
+                                        <p:cTn id="27" dur="500"/>
+                                        <p:tgtEl>
+                                          <p:spTgt spid="3">
+                                            <p:txEl>
+                                              <p:pRg st="4" end="4"/>
+                                            </p:txEl>
+                                          </p:spTgt>
+                                        </p:tgtEl>
+                                      </p:cBhvr>
+                                    </p:animEffect>
+                                  </p:childTnLst>
+                                </p:cTn>
+                              </p:par>
+                            </p:childTnLst>
+                          </p:cTn>
+                        </p:par>
+                      </p:childTnLst>
+                    </p:cTn>
+                  </p:par>
+                  <p:par>
+                    <p:cTn id="28" fill="hold">
+                      <p:stCondLst>
+                        <p:cond delay="indefinite"/>
+                      </p:stCondLst>
+                      <p:childTnLst>
+                        <p:par>
+                          <p:cTn id="29" fill="hold">
+                            <p:stCondLst>
+                              <p:cond delay="0"/>
+                            </p:stCondLst>
+                            <p:childTnLst>
+                              <p:par>
+                                <p:cTn id="30" presetID="10" presetClass="entr" presetSubtype="0" fill="hold" nodeType="clickEffect">
+                                  <p:stCondLst>
+                                    <p:cond delay="0"/>
+                                  </p:stCondLst>
+                                  <p:childTnLst>
+                                    <p:set>
+                                      <p:cBhvr>
+                                        <p:cTn id="31" dur="1" fill="hold">
+                                          <p:stCondLst>
+                                            <p:cond delay="0"/>
+                                          </p:stCondLst>
+                                        </p:cTn>
+                                        <p:tgtEl>
+                                          <p:spTgt spid="3">
+                                            <p:txEl>
+                                              <p:pRg st="5" end="5"/>
+                                            </p:txEl>
+                                          </p:spTgt>
+                                        </p:tgtEl>
+                                        <p:attrNameLst>
+                                          <p:attrName>style.visibility</p:attrName>
+                                        </p:attrNameLst>
+                                      </p:cBhvr>
+                                      <p:to>
+                                        <p:strVal val="visible"/>
+                                      </p:to>
+                                    </p:set>
+                                    <p:animEffect transition="in" filter="fade">
+                                      <p:cBhvr>
+                                        <p:cTn id="32" dur="500"/>
+                                        <p:tgtEl>
+                                          <p:spTgt spid="3">
+                                            <p:txEl>
+                                              <p:pRg st="5" end="5"/>
+                                            </p:txEl>
+                                          </p:spTgt>
+                                        </p:tgtEl>
+                                      </p:cBhvr>
+                                    </p:animEffect>
+                                  </p:childTnLst>
+                                </p:cTn>
+                              </p:par>
+                            </p:childTnLst>
+                          </p:cTn>
+                        </p:par>
+                      </p:childTnLst>
+                    </p:cTn>
+                  </p:par>
+                  <p:par>
+                    <p:cTn id="33" fill="hold">
+                      <p:stCondLst>
+                        <p:cond delay="indefinite"/>
+                      </p:stCondLst>
+                      <p:childTnLst>
+                        <p:par>
+                          <p:cTn id="34" fill="hold">
+                            <p:stCondLst>
+                              <p:cond delay="0"/>
+                            </p:stCondLst>
+                            <p:childTnLst>
+                              <p:par>
+                                <p:cTn id="35" presetID="10" presetClass="entr" presetSubtype="0" fill="hold" nodeType="clickEffect">
+                                  <p:stCondLst>
+                                    <p:cond delay="0"/>
+                                  </p:stCondLst>
+                                  <p:childTnLst>
+                                    <p:set>
+                                      <p:cBhvr>
+                                        <p:cTn id="36" dur="1" fill="hold">
+                                          <p:stCondLst>
+                                            <p:cond delay="0"/>
+                                          </p:stCondLst>
+                                        </p:cTn>
+                                        <p:tgtEl>
+                                          <p:spTgt spid="3">
+                                            <p:txEl>
+                                              <p:pRg st="6" end="6"/>
+                                            </p:txEl>
+                                          </p:spTgt>
+                                        </p:tgtEl>
+                                        <p:attrNameLst>
+                                          <p:attrName>style.visibility</p:attrName>
+                                        </p:attrNameLst>
+                                      </p:cBhvr>
+                                      <p:to>
+                                        <p:strVal val="visible"/>
+                                      </p:to>
+                                    </p:set>
+                                    <p:animEffect transition="in" filter="fade">
+                                      <p:cBhvr>
+                                        <p:cTn id="37" dur="500"/>
+                                        <p:tgtEl>
+                                          <p:spTgt spid="3">
+                                            <p:txEl>
+                                              <p:pRg st="6" end="6"/>
+                                            </p:txEl>
+                                          </p:spTgt>
+                                        </p:tgtEl>
+                                      </p:cBhvr>
+                                    </p:animEffect>
+                                  </p:childTnLst>
+                                </p:cTn>
+                              </p:par>
+                            </p:childTnLst>
+                          </p:cTn>
+                        </p:par>
+                      </p:childTnLst>
+                    </p:cTn>
+                  </p:par>
+                  <p:par>
+                    <p:cTn id="38" fill="hold">
+                      <p:stCondLst>
+                        <p:cond delay="indefinite"/>
+                      </p:stCondLst>
+                      <p:childTnLst>
+                        <p:par>
+                          <p:cTn id="39" fill="hold">
+                            <p:stCondLst>
+                              <p:cond delay="0"/>
+                            </p:stCondLst>
+                            <p:childTnLst>
+                              <p:par>
+                                <p:cTn id="40" presetID="10" presetClass="entr" presetSubtype="0" fill="hold" nodeType="clickEffect">
+                                  <p:stCondLst>
+                                    <p:cond delay="0"/>
+                                  </p:stCondLst>
+                                  <p:childTnLst>
+                                    <p:set>
+                                      <p:cBhvr>
+                                        <p:cTn id="41" dur="1" fill="hold">
+                                          <p:stCondLst>
+                                            <p:cond delay="0"/>
+                                          </p:stCondLst>
+                                        </p:cTn>
+                                        <p:tgtEl>
+                                          <p:spTgt spid="3">
+                                            <p:txEl>
+                                              <p:pRg st="7" end="7"/>
+                                            </p:txEl>
+                                          </p:spTgt>
+                                        </p:tgtEl>
+                                        <p:attrNameLst>
+                                          <p:attrName>style.visibility</p:attrName>
+                                        </p:attrNameLst>
+                                      </p:cBhvr>
+                                      <p:to>
+                                        <p:strVal val="visible"/>
+                                      </p:to>
+                                    </p:set>
+                                    <p:animEffect transition="in" filter="fade">
+                                      <p:cBhvr>
+                                        <p:cTn id="42" dur="500"/>
+                                        <p:tgtEl>
+                                          <p:spTgt spid="3">
+                                            <p:txEl>
+                                              <p:pRg st="7" end="7"/>
+                                            </p:txEl>
+                                          </p:spTgt>
+                                        </p:tgtEl>
+                                      </p:cBhvr>
+                                    </p:animEffect>
+                                  </p:childTnLst>
+                                </p:cTn>
+                              </p:par>
+                            </p:childTnLst>
+                          </p:cTn>
+                        </p:par>
+                      </p:childTnLst>
+                    </p:cTn>
+                  </p:par>
+                  <p:par>
+                    <p:cTn id="43" fill="hold">
+                      <p:stCondLst>
+                        <p:cond delay="indefinite"/>
+                      </p:stCondLst>
+                      <p:childTnLst>
+                        <p:par>
+                          <p:cTn id="44" fill="hold">
+                            <p:stCondLst>
+                              <p:cond delay="0"/>
+                            </p:stCondLst>
+                            <p:childTnLst>
+                              <p:par>
+                                <p:cTn id="45" presetID="10" presetClass="entr" presetSubtype="0" fill="hold" nodeType="clickEffect">
+                                  <p:stCondLst>
+                                    <p:cond delay="0"/>
+                                  </p:stCondLst>
+                                  <p:childTnLst>
+                                    <p:set>
+                                      <p:cBhvr>
+                                        <p:cTn id="46" dur="1" fill="hold">
+                                          <p:stCondLst>
+                                            <p:cond delay="0"/>
+                                          </p:stCondLst>
+                                        </p:cTn>
+                                        <p:tgtEl>
+                                          <p:spTgt spid="3">
+                                            <p:txEl>
+                                              <p:pRg st="8" end="8"/>
+                                            </p:txEl>
+                                          </p:spTgt>
+                                        </p:tgtEl>
+                                        <p:attrNameLst>
+                                          <p:attrName>style.visibility</p:attrName>
+                                        </p:attrNameLst>
+                                      </p:cBhvr>
+                                      <p:to>
+                                        <p:strVal val="visible"/>
+                                      </p:to>
+                                    </p:set>
+                                    <p:animEffect transition="in" filter="fade">
+                                      <p:cBhvr>
+                                        <p:cTn id="47" dur="500"/>
+                                        <p:tgtEl>
+                                          <p:spTgt spid="3">
+                                            <p:txEl>
+                                              <p:pRg st="8" end="8"/>
+                                            </p:txEl>
+                                          </p:spTgt>
+                                        </p:tgtEl>
+                                      </p:cBhvr>
+                                    </p:animEffect>
+                                  </p:childTnLst>
+                                </p:cTn>
+                              </p:par>
+                            </p:childTnLst>
+                          </p:cTn>
+                        </p:par>
+                      </p:childTnLst>
+                    </p:cTn>
+                  </p:par>
+                </p:childTnLst>
+              </p:cTn>
+              <p:prevCondLst>
+                <p:cond evt="onPrev" delay="0">
+                  <p:tgtEl>
+                    <p:sldTgt/>
+                  </p:tgtEl>
+                </p:cond>
+              </p:prevCondLst>
+              <p:nextCondLst>
+                <p:cond evt="onNext" delay="0">
+                  <p:tgtEl>
+                    <p:sldTgt/>
+                  </p:tgtEl>
+                </p:cond>
+              </p:nextCondLst>
+            </p:seq>
+          </p:childTnLst>
+        </p:cTn>
+      </p:par>
+    </p:tnLst>
+  </p:timing>
+</p:sld>
+</file>
+
+<file path=ppt/slides/slide9.xml><?xml version="1.0" encoding="utf-8"?>
+<p:sld xmlns:a="http://schemas.openxmlformats.org/drawingml/2006/main" xmlns:r="http://schemas.openxmlformats.org/officeDocument/2006/relationships" xmlns:p="http://schemas.openxmlformats.org/presentationml/2006/main">
+  <p:cSld>
+    <p:spTree>
+      <p:nvGrpSpPr>
+        <p:cNvPr id="1" name=""/>
+        <p:cNvGrpSpPr/>
+        <p:nvPr/>
+      </p:nvGrpSpPr>
+      <p:grpSpPr>
+        <a:xfrm>
+          <a:off x="0" y="0"/>
+          <a:ext cx="0" cy="0"/>
+          <a:chOff x="0" y="0"/>
+          <a:chExt cx="0" cy="0"/>
+        </a:xfrm>
+      </p:grpSpPr>
+      <p:sp>
+        <p:nvSpPr>
+          <p:cNvPr id="2" name="Title 1"/>
+          <p:cNvSpPr>
+            <a:spLocks noGrp="1"/>
+          </p:cNvSpPr>
+          <p:nvPr>
+            <p:ph type="title"/>
+          </p:nvPr>
+        </p:nvSpPr>
+        <p:spPr/>
+        <p:txBody>
+          <a:bodyPr/>
+          <a:lstStyle/>
+          <a:p>
+            <a:r>
+              <a:rPr lang="en-GB" dirty="0"/>
+              <a:t>Demo</a:t>
+            </a:r>
+          </a:p>
+        </p:txBody>
+      </p:sp>
+      <p:sp>
+        <p:nvSpPr>
+          <p:cNvPr id="3" name="Content Placeholder 2"/>
+          <p:cNvSpPr>
+            <a:spLocks noGrp="1"/>
+          </p:cNvSpPr>
+          <p:nvPr>
+            <p:ph idx="1"/>
+          </p:nvPr>
+        </p:nvSpPr>
+        <p:spPr/>
+        <p:txBody>
+          <a:bodyPr/>
+          <a:lstStyle/>
+          <a:p>
+            <a:r>
+              <a:rPr lang="en-GB" dirty="0"/>
+              <a:t>Language Service</a:t>
+            </a:r>
+          </a:p>
+          <a:p>
+            <a:endParaRPr lang="en-GB" dirty="0"/>
+          </a:p>
+          <a:p>
+            <a:pPr marL="228600" lvl="1" indent="0">
+              <a:buNone/>
+            </a:pPr>
+            <a:r>
+              <a:rPr lang="en-GB" dirty="0"/>
+              <a:t>GET ../</a:t>
+            </a:r>
+            <a:r>
+              <a:rPr lang="en-GB" dirty="0" err="1"/>
+              <a:t>languageService</a:t>
+            </a:r>
+            <a:r>
+              <a:rPr lang="en-GB" dirty="0"/>
+              <a:t>/random</a:t>
+            </a:r>
+          </a:p>
+          <a:p>
+            <a:pPr marL="228600" lvl="1" indent="0">
+              <a:buNone/>
+            </a:pPr>
+            <a:endParaRPr lang="en-GB" dirty="0"/>
+          </a:p>
+          <a:p>
+            <a:pPr marL="228600" lvl="1" indent="0">
+              <a:buNone/>
+            </a:pPr>
+            <a:r>
+              <a:rPr lang="en-GB" dirty="0"/>
+              <a:t>	{  </a:t>
+            </a:r>
+          </a:p>
+          <a:p>
+            <a:pPr marL="228600" lvl="1" indent="0">
+              <a:buNone/>
+            </a:pPr>
+            <a:r>
+              <a:rPr lang="en-GB" dirty="0"/>
+              <a:t>		"name": "Erlang",  </a:t>
+            </a:r>
+          </a:p>
+          <a:p>
+            <a:pPr marL="228600" lvl="1" indent="0">
+              <a:buNone/>
+            </a:pPr>
+            <a:r>
+              <a:rPr lang="en-GB" dirty="0"/>
+              <a:t>		"type": "Functional", </a:t>
+            </a:r>
+          </a:p>
+          <a:p>
+            <a:pPr marL="228600" lvl="1" indent="0">
+              <a:buNone/>
+            </a:pPr>
+            <a:r>
+              <a:rPr lang="en-GB" dirty="0"/>
+              <a:t>		 "</a:t>
+            </a:r>
+            <a:r>
+              <a:rPr lang="en-GB" dirty="0" err="1"/>
+              <a:t>yearCreated</a:t>
+            </a:r>
+            <a:r>
+              <a:rPr lang="en-GB" dirty="0"/>
+              <a:t>": 1986</a:t>
+            </a:r>
+          </a:p>
+          <a:p>
+            <a:pPr marL="228600" lvl="1" indent="0">
+              <a:buNone/>
+            </a:pPr>
+            <a:r>
+              <a:rPr lang="en-GB" dirty="0"/>
+              <a:t>	}</a:t>
+            </a:r>
+          </a:p>
+        </p:txBody>
+      </p:sp>
+    </p:spTree>
+    <p:extLst>
+      <p:ext uri="{BB962C8B-B14F-4D97-AF65-F5344CB8AC3E}">
+        <p14:creationId xmlns:p14="http://schemas.microsoft.com/office/powerpoint/2010/main" val="1706836761"/>
+      </p:ext>
+    </p:extLst>
+  </p:cSld>
+  <p:clrMapOvr>
+    <a:masterClrMapping/>
+  </p:clrMapOvr>
+  <p:timing>
+    <p:tnLst>
+      <p:par>
+        <p:cTn id="1" dur="indefinite" restart="never" nodeType="tmRoot">
+          <p:childTnLst>
+            <p:seq concurrent="1" nextAc="seek">
+              <p:cTn id="2" dur="indefinite" nodeType="mainSeq">
+                <p:childTnLst>
+                  <p:par>
+                    <p:cTn id="3" fill="hold">
+                      <p:stCondLst>
+                        <p:cond delay="indefinite"/>
+                      </p:stCondLst>
+                      <p:childTnLst>
+                        <p:par>
+                          <p:cTn id="4" fill="hold">
+                            <p:stCondLst>
+                              <p:cond delay="0"/>
+                            </p:stCondLst>
+                            <p:childTnLst>
+                              <p:par>
+                                <p:cTn id="5" presetID="10" presetClass="entr" presetSubtype="0" fill="hold" nodeType="clickEffect">
+                                  <p:stCondLst>
+                                    <p:cond delay="0"/>
+                                  </p:stCondLst>
+                                  <p:childTnLst>
+                                    <p:set>
+                                      <p:cBhvr>
+                                        <p:cTn id="6" dur="1" fill="hold">
+                                          <p:stCondLst>
+                                            <p:cond delay="0"/>
+                                          </p:stCondLst>
+                                        </p:cTn>
+                                        <p:tgtEl>
+                                          <p:spTgt spid="3">
+                                            <p:txEl>
+                                              <p:pRg st="0" end="0"/>
+                                            </p:txEl>
+                                          </p:spTgt>
+                                        </p:tgtEl>
+                                        <p:attrNameLst>
+                                          <p:attrName>style.visibility</p:attrName>
+                                        </p:attrNameLst>
+                                      </p:cBhvr>
+                                      <p:to>
+                                        <p:strVal val="visible"/>
+                                      </p:to>
+                                    </p:set>
+                                    <p:animEffect transition="in" filter="fade">
+                                      <p:cBhvr>
+                                        <p:cTn id="7" dur="500"/>
+                                        <p:tgtEl>
+                                          <p:spTgt spid="3">
+                                            <p:txEl>
+                                              <p:pRg st="0" end="0"/>
+                                            </p:txEl>
+                                          </p:spTgt>
+                                        </p:tgtEl>
+                                      </p:cBhvr>
+                                    </p:animEffect>
+                                  </p:childTnLst>
+                                </p:cTn>
+                              </p:par>
+                            </p:childTnLst>
+                          </p:cTn>
+                        </p:par>
+                      </p:childTnLst>
+                    </p:cTn>
+                  </p:par>
+                  <p:par>
+                    <p:cTn id="8" fill="hold">
+                      <p:stCondLst>
+                        <p:cond delay="indefinite"/>
+                      </p:stCondLst>
+                      <p:childTnLst>
+                        <p:par>
+                          <p:cTn id="9" fill="hold">
+                            <p:stCondLst>
+                              <p:cond delay="0"/>
+                            </p:stCondLst>
+                            <p:childTnLst>
+                              <p:par>
+                                <p:cTn id="10" presetID="10" presetClass="entr" presetSubtype="0" fill="hold" nodeType="clickEffect">
+                                  <p:stCondLst>
+                                    <p:cond delay="0"/>
+                                  </p:stCondLst>
+                                  <p:childTnLst>
+                                    <p:set>
+                                      <p:cBhvr>
+                                        <p:cTn id="11" dur="1" fill="hold">
+                                          <p:stCondLst>
+                                            <p:cond delay="0"/>
+                                          </p:stCondLst>
+                                        </p:cTn>
+                                        <p:tgtEl>
+                                          <p:spTgt spid="3">
+                                            <p:txEl>
+                                              <p:pRg st="2" end="2"/>
+                                            </p:txEl>
+                                          </p:spTgt>
+                                        </p:tgtEl>
+                                        <p:attrNameLst>
+                                          <p:attrName>style.visibility</p:attrName>
+                                        </p:attrNameLst>
+                                      </p:cBhvr>
+                                      <p:to>
+                                        <p:strVal val="visible"/>
+                                      </p:to>
+                                    </p:set>
+                                    <p:animEffect transition="in" filter="fade">
+                                      <p:cBhvr>
+                                        <p:cTn id="12" dur="500"/>
+                                        <p:tgtEl>
+                                          <p:spTgt spid="3">
+                                            <p:txEl>
+                                              <p:pRg st="2" end="2"/>
+                                            </p:txEl>
+                                          </p:spTgt>
+                                        </p:tgtEl>
+                                      </p:cBhvr>
+                                    </p:animEffect>
+                                  </p:childTnLst>
+                                </p:cTn>
+                              </p:par>
+                            </p:childTnLst>
+                          </p:cTn>
+                        </p:par>
+                      </p:childTnLst>
+                    </p:cTn>
+                  </p:par>
+                  <p:par>
+                    <p:cTn id="13" fill="hold">
+                      <p:stCondLst>
+                        <p:cond delay="indefinite"/>
+                      </p:stCondLst>
+                      <p:childTnLst>
+                        <p:par>
+                          <p:cTn id="14" fill="hold">
+                            <p:stCondLst>
+                              <p:cond delay="0"/>
+                            </p:stCondLst>
+                            <p:childTnLst>
+                              <p:par>
+                                <p:cTn id="15" presetID="10" presetClass="entr" presetSubtype="0" fill="hold" nodeType="clickEffect">
+                                  <p:stCondLst>
+                                    <p:cond delay="0"/>
+                                  </p:stCondLst>
+                                  <p:childTnLst>
+                                    <p:set>
+                                      <p:cBhvr>
+                                        <p:cTn id="16" dur="1" fill="hold">
+                                          <p:stCondLst>
+                                            <p:cond delay="0"/>
+                                          </p:stCondLst>
+                                        </p:cTn>
+                                        <p:tgtEl>
+                                          <p:spTgt spid="3">
+                                            <p:txEl>
+                                              <p:pRg st="4" end="4"/>
+                                            </p:txEl>
+                                          </p:spTgt>
+                                        </p:tgtEl>
+                                        <p:attrNameLst>
+                                          <p:attrName>style.visibility</p:attrName>
+                                        </p:attrNameLst>
+                                      </p:cBhvr>
+                                      <p:to>
+                                        <p:strVal val="visible"/>
+                                      </p:to>
+                                    </p:set>
+                                    <p:animEffect transition="in" filter="fade">
+                                      <p:cBhvr>
+                                        <p:cTn id="17" dur="500"/>
+                                        <p:tgtEl>
+                                          <p:spTgt spid="3">
+                                            <p:txEl>
+                                              <p:pRg st="4" end="4"/>
+                                            </p:txEl>
+                                          </p:spTgt>
+                                        </p:tgtEl>
+                                      </p:cBhvr>
+                                    </p:animEffect>
+                                  </p:childTnLst>
+                                </p:cTn>
+                              </p:par>
+                              <p:par>
+                                <p:cTn id="18" presetID="10" presetClass="entr" presetSubtype="0" fill="hold" nodeType="withEffect">
+                                  <p:stCondLst>
+                                    <p:cond delay="0"/>
+                                  </p:stCondLst>
+                                  <p:childTnLst>
+                                    <p:set>
+                                      <p:cBhvr>
+                                        <p:cTn id="19" dur="1" fill="hold">
+                                          <p:stCondLst>
+                                            <p:cond delay="0"/>
+                                          </p:stCondLst>
+                                        </p:cTn>
+                                        <p:tgtEl>
+                                          <p:spTgt spid="3">
+                                            <p:txEl>
+                                              <p:pRg st="5" end="5"/>
+                                            </p:txEl>
+                                          </p:spTgt>
+                                        </p:tgtEl>
+                                        <p:attrNameLst>
+                                          <p:attrName>style.visibility</p:attrName>
+                                        </p:attrNameLst>
+                                      </p:cBhvr>
+                                      <p:to>
+                                        <p:strVal val="visible"/>
+                                      </p:to>
+                                    </p:set>
+                                    <p:animEffect transition="in" filter="fade">
+                                      <p:cBhvr>
+                                        <p:cTn id="20" dur="500"/>
+                                        <p:tgtEl>
+                                          <p:spTgt spid="3">
+                                            <p:txEl>
+                                              <p:pRg st="5" end="5"/>
+                                            </p:txEl>
+                                          </p:spTgt>
+                                        </p:tgtEl>
+                                      </p:cBhvr>
+                                    </p:animEffect>
+                                  </p:childTnLst>
+                                </p:cTn>
+                              </p:par>
+                              <p:par>
+                                <p:cTn id="21" presetID="10" presetClass="entr" presetSubtype="0" fill="hold" nodeType="withEffect">
+                                  <p:stCondLst>
+                                    <p:cond delay="0"/>
+                                  </p:stCondLst>
+                                  <p:childTnLst>
+                                    <p:set>
+                                      <p:cBhvr>
+                                        <p:cTn id="22" dur="1" fill="hold">
+                                          <p:stCondLst>
+                                            <p:cond delay="0"/>
+                                          </p:stCondLst>
+                                        </p:cTn>
+                                        <p:tgtEl>
+                                          <p:spTgt spid="3">
+                                            <p:txEl>
+                                              <p:pRg st="6" end="6"/>
+                                            </p:txEl>
+                                          </p:spTgt>
+                                        </p:tgtEl>
+                                        <p:attrNameLst>
+                                          <p:attrName>style.visibility</p:attrName>
+                                        </p:attrNameLst>
+                                      </p:cBhvr>
+                                      <p:to>
+                                        <p:strVal val="visible"/>
+                                      </p:to>
+                                    </p:set>
+                                    <p:animEffect transition="in" filter="fade">
+                                      <p:cBhvr>
+                                        <p:cTn id="23" dur="500"/>
+                                        <p:tgtEl>
+                                          <p:spTgt spid="3">
+                                            <p:txEl>
+                                              <p:pRg st="6" end="6"/>
+                                            </p:txEl>
+                                          </p:spTgt>
+                                        </p:tgtEl>
+                                      </p:cBhvr>
+                                    </p:animEffect>
+                                  </p:childTnLst>
+                                </p:cTn>
+                              </p:par>
+                              <p:par>
+                                <p:cTn id="24" presetID="10" presetClass="entr" presetSubtype="0" fill="hold" nodeType="withEffect">
+                                  <p:stCondLst>
+                                    <p:cond delay="0"/>
+                                  </p:stCondLst>
+                                  <p:childTnLst>
+                                    <p:set>
+                                      <p:cBhvr>
+                                        <p:cTn id="25" dur="1" fill="hold">
+                                          <p:stCondLst>
+                                            <p:cond delay="0"/>
+                                          </p:stCondLst>
+                                        </p:cTn>
+                                        <p:tgtEl>
+                                          <p:spTgt spid="3">
+                                            <p:txEl>
+                                              <p:pRg st="7" end="7"/>
+                                            </p:txEl>
+                                          </p:spTgt>
+                                        </p:tgtEl>
+                                        <p:attrNameLst>
+                                          <p:attrName>style.visibility</p:attrName>
+                                        </p:attrNameLst>
+                                      </p:cBhvr>
+                                      <p:to>
+                                        <p:strVal val="visible"/>
+                                      </p:to>
+                                    </p:set>
+                                    <p:animEffect transition="in" filter="fade">
+                                      <p:cBhvr>
+                                        <p:cTn id="26" dur="500"/>
+                                        <p:tgtEl>
+                                          <p:spTgt spid="3">
+                                            <p:txEl>
+                                              <p:pRg st="7" end="7"/>
+                                            </p:txEl>
+                                          </p:spTgt>
+                                        </p:tgtEl>
+                                      </p:cBhvr>
+                                    </p:animEffect>
+                                  </p:childTnLst>
+                                </p:cTn>
+                              </p:par>
+                              <p:par>
+                                <p:cTn id="27" presetID="10" presetClass="entr" presetSubtype="0" fill="hold" nodeType="withEffect">
+                                  <p:stCondLst>
+                                    <p:cond delay="0"/>
+                                  </p:stCondLst>
+                                  <p:childTnLst>
+                                    <p:set>
+                                      <p:cBhvr>
+                                        <p:cTn id="28" dur="1" fill="hold">
+                                          <p:stCondLst>
+                                            <p:cond delay="0"/>
+                                          </p:stCondLst>
+                                        </p:cTn>
+                                        <p:tgtEl>
+                                          <p:spTgt spid="3">
+                                            <p:txEl>
+                                              <p:pRg st="8" end="8"/>
+                                            </p:txEl>
+                                          </p:spTgt>
+                                        </p:tgtEl>
+                                        <p:attrNameLst>
+                                          <p:attrName>style.visibility</p:attrName>
+                                        </p:attrNameLst>
+                                      </p:cBhvr>
+                                      <p:to>
+                                        <p:strVal val="visible"/>
+                                      </p:to>
+                                    </p:set>
+                                    <p:animEffect transition="in" filter="fade">
+                                      <p:cBhvr>
+                                        <p:cTn id="29" dur="500"/>
+                                        <p:tgtEl>
+                                          <p:spTgt spid="3">
+                                            <p:txEl>
+                                              <p:pRg st="8" end="8"/>
+                                            </p:txEl>
+                                          </p:spTgt>
+                                        </p:tgtEl>
+                                      </p:cBhvr>
+                                    </p:animEffect>
+                                  </p:childTnLst>
+                                </p:cTn>
+                              </p:par>
+                            </p:childTnLst>
+                          </p:cTn>
+                        </p:par>
+                      </p:childTnLst>
+                    </p:cTn>
+                  </p:par>
+                </p:childTnLst>
+              </p:cTn>
+              <p:prevCondLst>
+                <p:cond evt="onPrev" delay="0">
+                  <p:tgtEl>
+                    <p:sldTgt/>
+                  </p:tgtEl>
+                </p:cond>
+              </p:prevCondLst>
+              <p:nextCondLst>
+                <p:cond evt="onNext" delay="0">
+                  <p:tgtEl>
+                    <p:sldTgt/>
+                  </p:tgtEl>
+                </p:cond>
+              </p:nextCondLst>
+            </p:seq>
+          </p:childTnLst>
+        </p:cTn>
+      </p:par>
+    </p:tnLst>
+  </p:timing>
 </p:sld>
 </file>
 

</xml_diff>